<commit_message>
What I Learned Today
</commit_message>
<xml_diff>
--- a/projeto-individual/Presentation1.pptx
+++ b/projeto-individual/Presentation1.pptx
@@ -9,7 +9,8 @@
     <p:sldId id="257" r:id="rId3"/>
     <p:sldId id="258" r:id="rId4"/>
     <p:sldId id="259" r:id="rId5"/>
-    <p:sldId id="260" r:id="rId6"/>
+    <p:sldId id="263" r:id="rId6"/>
+    <p:sldId id="260" r:id="rId7"/>
   </p:sldIdLst>
   <p:sldSz cx="12192000" cy="6858000"/>
   <p:notesSz cx="6858000" cy="9144000"/>
@@ -297,7 +298,7 @@
           <a:p>
             <a:fld id="{330EA680-D336-4FF7-8B7A-9848BB0A1C32}" type="slidenum">
               <a:rPr lang="en-US" smtClean="0"/>
-              <a:t>‹#›</a:t>
+              <a:t>‹nº›</a:t>
             </a:fld>
             <a:endParaRPr lang="en-US"/>
           </a:p>
@@ -467,7 +468,7 @@
           <a:p>
             <a:fld id="{330EA680-D336-4FF7-8B7A-9848BB0A1C32}" type="slidenum">
               <a:rPr lang="en-US" smtClean="0"/>
-              <a:t>‹#›</a:t>
+              <a:t>‹nº›</a:t>
             </a:fld>
             <a:endParaRPr lang="en-US"/>
           </a:p>
@@ -647,7 +648,7 @@
           <a:p>
             <a:fld id="{330EA680-D336-4FF7-8B7A-9848BB0A1C32}" type="slidenum">
               <a:rPr lang="en-US" smtClean="0"/>
-              <a:t>‹#›</a:t>
+              <a:t>‹nº›</a:t>
             </a:fld>
             <a:endParaRPr lang="en-US"/>
           </a:p>
@@ -817,7 +818,7 @@
           <a:p>
             <a:fld id="{330EA680-D336-4FF7-8B7A-9848BB0A1C32}" type="slidenum">
               <a:rPr lang="en-US" smtClean="0"/>
-              <a:t>‹#›</a:t>
+              <a:t>‹nº›</a:t>
             </a:fld>
             <a:endParaRPr lang="en-US"/>
           </a:p>
@@ -1063,7 +1064,7 @@
           <a:p>
             <a:fld id="{330EA680-D336-4FF7-8B7A-9848BB0A1C32}" type="slidenum">
               <a:rPr lang="en-US" smtClean="0"/>
-              <a:t>‹#›</a:t>
+              <a:t>‹nº›</a:t>
             </a:fld>
             <a:endParaRPr lang="en-US"/>
           </a:p>
@@ -1295,7 +1296,7 @@
           <a:p>
             <a:fld id="{330EA680-D336-4FF7-8B7A-9848BB0A1C32}" type="slidenum">
               <a:rPr lang="en-US" smtClean="0"/>
-              <a:t>‹#›</a:t>
+              <a:t>‹nº›</a:t>
             </a:fld>
             <a:endParaRPr lang="en-US"/>
           </a:p>
@@ -1662,7 +1663,7 @@
           <a:p>
             <a:fld id="{330EA680-D336-4FF7-8B7A-9848BB0A1C32}" type="slidenum">
               <a:rPr lang="en-US" smtClean="0"/>
-              <a:t>‹#›</a:t>
+              <a:t>‹nº›</a:t>
             </a:fld>
             <a:endParaRPr lang="en-US"/>
           </a:p>
@@ -1780,7 +1781,7 @@
           <a:p>
             <a:fld id="{330EA680-D336-4FF7-8B7A-9848BB0A1C32}" type="slidenum">
               <a:rPr lang="en-US" smtClean="0"/>
-              <a:t>‹#›</a:t>
+              <a:t>‹nº›</a:t>
             </a:fld>
             <a:endParaRPr lang="en-US"/>
           </a:p>
@@ -1875,7 +1876,7 @@
           <a:p>
             <a:fld id="{330EA680-D336-4FF7-8B7A-9848BB0A1C32}" type="slidenum">
               <a:rPr lang="en-US" smtClean="0"/>
-              <a:t>‹#›</a:t>
+              <a:t>‹nº›</a:t>
             </a:fld>
             <a:endParaRPr lang="en-US"/>
           </a:p>
@@ -2152,7 +2153,7 @@
           <a:p>
             <a:fld id="{330EA680-D336-4FF7-8B7A-9848BB0A1C32}" type="slidenum">
               <a:rPr lang="en-US" smtClean="0"/>
-              <a:t>‹#›</a:t>
+              <a:t>‹nº›</a:t>
             </a:fld>
             <a:endParaRPr lang="en-US"/>
           </a:p>
@@ -2409,7 +2410,7 @@
           <a:p>
             <a:fld id="{330EA680-D336-4FF7-8B7A-9848BB0A1C32}" type="slidenum">
               <a:rPr lang="en-US" smtClean="0"/>
-              <a:t>‹#›</a:t>
+              <a:t>‹nº›</a:t>
             </a:fld>
             <a:endParaRPr lang="en-US"/>
           </a:p>
@@ -2658,7 +2659,7 @@
           <a:p>
             <a:fld id="{330EA680-D336-4FF7-8B7A-9848BB0A1C32}" type="slidenum">
               <a:rPr lang="en-US" smtClean="0"/>
-              <a:t>‹#›</a:t>
+              <a:t>‹nº›</a:t>
             </a:fld>
             <a:endParaRPr lang="en-US"/>
           </a:p>
@@ -4828,6 +4829,288 @@
 <file path=ppt/slides/slide5.xml><?xml version="1.0" encoding="utf-8"?>
 <p:sld xmlns:a="http://schemas.openxmlformats.org/drawingml/2006/main" xmlns:r="http://schemas.openxmlformats.org/officeDocument/2006/relationships" xmlns:p="http://schemas.openxmlformats.org/presentationml/2006/main">
   <p:cSld>
+    <p:spTree>
+      <p:nvGrpSpPr>
+        <p:cNvPr id="1" name=""/>
+        <p:cNvGrpSpPr/>
+        <p:nvPr/>
+      </p:nvGrpSpPr>
+      <p:grpSpPr>
+        <a:xfrm>
+          <a:off x="0" y="0"/>
+          <a:ext cx="0" cy="0"/>
+          <a:chOff x="0" y="0"/>
+          <a:chExt cx="0" cy="0"/>
+        </a:xfrm>
+      </p:grpSpPr>
+      <p:sp>
+        <p:nvSpPr>
+          <p:cNvPr id="12" name="Subtitle 2">
+            <a:extLst>
+              <a:ext uri="{FF2B5EF4-FFF2-40B4-BE49-F238E27FC236}">
+                <a16:creationId xmlns:a16="http://schemas.microsoft.com/office/drawing/2014/main" id="{02B3371F-A4C4-4D01-8AC1-3D15A7627A57}"/>
+              </a:ext>
+            </a:extLst>
+          </p:cNvPr>
+          <p:cNvSpPr>
+            <a:spLocks noGrp="1"/>
+          </p:cNvSpPr>
+          <p:nvPr/>
+        </p:nvSpPr>
+        <p:spPr>
+          <a:xfrm>
+            <a:off x="4559648" y="299037"/>
+            <a:ext cx="3285767" cy="1166388"/>
+          </a:xfrm>
+          <a:prstGeom prst="rect">
+            <a:avLst/>
+          </a:prstGeom>
+        </p:spPr>
+        <p:txBody>
+          <a:bodyPr vert="horz" lIns="91440" tIns="45720" rIns="91440" bIns="45720" rtlCol="0" anchor="t">
+            <a:noAutofit/>
+          </a:bodyPr>
+          <a:lstStyle>
+            <a:lvl1pPr marL="0" indent="0" algn="ctr" defTabSz="914400" rtl="0" eaLnBrk="1" latinLnBrk="0" hangingPunct="1">
+              <a:lnSpc>
+                <a:spcPct val="90000"/>
+              </a:lnSpc>
+              <a:spcBef>
+                <a:spcPts val="1000"/>
+              </a:spcBef>
+              <a:buFont typeface="Arial" panose="020B0604020202020204" pitchFamily="34" charset="0"/>
+              <a:buNone/>
+              <a:defRPr sz="2400" kern="1200">
+                <a:solidFill>
+                  <a:schemeClr val="tx1"/>
+                </a:solidFill>
+                <a:latin typeface="+mn-lt"/>
+                <a:ea typeface="+mn-ea"/>
+                <a:cs typeface="+mn-cs"/>
+              </a:defRPr>
+            </a:lvl1pPr>
+            <a:lvl2pPr marL="457200" indent="0" algn="ctr" defTabSz="914400" rtl="0" eaLnBrk="1" latinLnBrk="0" hangingPunct="1">
+              <a:lnSpc>
+                <a:spcPct val="90000"/>
+              </a:lnSpc>
+              <a:spcBef>
+                <a:spcPts val="500"/>
+              </a:spcBef>
+              <a:buFont typeface="Arial" panose="020B0604020202020204" pitchFamily="34" charset="0"/>
+              <a:buNone/>
+              <a:defRPr sz="2000" kern="1200">
+                <a:solidFill>
+                  <a:schemeClr val="tx1"/>
+                </a:solidFill>
+                <a:latin typeface="+mn-lt"/>
+                <a:ea typeface="+mn-ea"/>
+                <a:cs typeface="+mn-cs"/>
+              </a:defRPr>
+            </a:lvl2pPr>
+            <a:lvl3pPr marL="914400" indent="0" algn="ctr" defTabSz="914400" rtl="0" eaLnBrk="1" latinLnBrk="0" hangingPunct="1">
+              <a:lnSpc>
+                <a:spcPct val="90000"/>
+              </a:lnSpc>
+              <a:spcBef>
+                <a:spcPts val="500"/>
+              </a:spcBef>
+              <a:buFont typeface="Arial" panose="020B0604020202020204" pitchFamily="34" charset="0"/>
+              <a:buNone/>
+              <a:defRPr sz="1800" kern="1200">
+                <a:solidFill>
+                  <a:schemeClr val="tx1"/>
+                </a:solidFill>
+                <a:latin typeface="+mn-lt"/>
+                <a:ea typeface="+mn-ea"/>
+                <a:cs typeface="+mn-cs"/>
+              </a:defRPr>
+            </a:lvl3pPr>
+            <a:lvl4pPr marL="1371600" indent="0" algn="ctr" defTabSz="914400" rtl="0" eaLnBrk="1" latinLnBrk="0" hangingPunct="1">
+              <a:lnSpc>
+                <a:spcPct val="90000"/>
+              </a:lnSpc>
+              <a:spcBef>
+                <a:spcPts val="500"/>
+              </a:spcBef>
+              <a:buFont typeface="Arial" panose="020B0604020202020204" pitchFamily="34" charset="0"/>
+              <a:buNone/>
+              <a:defRPr sz="1600" kern="1200">
+                <a:solidFill>
+                  <a:schemeClr val="tx1"/>
+                </a:solidFill>
+                <a:latin typeface="+mn-lt"/>
+                <a:ea typeface="+mn-ea"/>
+                <a:cs typeface="+mn-cs"/>
+              </a:defRPr>
+            </a:lvl4pPr>
+            <a:lvl5pPr marL="1828800" indent="0" algn="ctr" defTabSz="914400" rtl="0" eaLnBrk="1" latinLnBrk="0" hangingPunct="1">
+              <a:lnSpc>
+                <a:spcPct val="90000"/>
+              </a:lnSpc>
+              <a:spcBef>
+                <a:spcPts val="500"/>
+              </a:spcBef>
+              <a:buFont typeface="Arial" panose="020B0604020202020204" pitchFamily="34" charset="0"/>
+              <a:buNone/>
+              <a:defRPr sz="1600" kern="1200">
+                <a:solidFill>
+                  <a:schemeClr val="tx1"/>
+                </a:solidFill>
+                <a:latin typeface="+mn-lt"/>
+                <a:ea typeface="+mn-ea"/>
+                <a:cs typeface="+mn-cs"/>
+              </a:defRPr>
+            </a:lvl5pPr>
+            <a:lvl6pPr marL="2286000" indent="0" algn="ctr" defTabSz="914400" rtl="0" eaLnBrk="1" latinLnBrk="0" hangingPunct="1">
+              <a:lnSpc>
+                <a:spcPct val="90000"/>
+              </a:lnSpc>
+              <a:spcBef>
+                <a:spcPts val="500"/>
+              </a:spcBef>
+              <a:buFont typeface="Arial" panose="020B0604020202020204" pitchFamily="34" charset="0"/>
+              <a:buNone/>
+              <a:defRPr sz="1600" kern="1200">
+                <a:solidFill>
+                  <a:schemeClr val="tx1"/>
+                </a:solidFill>
+                <a:latin typeface="+mn-lt"/>
+                <a:ea typeface="+mn-ea"/>
+                <a:cs typeface="+mn-cs"/>
+              </a:defRPr>
+            </a:lvl6pPr>
+            <a:lvl7pPr marL="2743200" indent="0" algn="ctr" defTabSz="914400" rtl="0" eaLnBrk="1" latinLnBrk="0" hangingPunct="1">
+              <a:lnSpc>
+                <a:spcPct val="90000"/>
+              </a:lnSpc>
+              <a:spcBef>
+                <a:spcPts val="500"/>
+              </a:spcBef>
+              <a:buFont typeface="Arial" panose="020B0604020202020204" pitchFamily="34" charset="0"/>
+              <a:buNone/>
+              <a:defRPr sz="1600" kern="1200">
+                <a:solidFill>
+                  <a:schemeClr val="tx1"/>
+                </a:solidFill>
+                <a:latin typeface="+mn-lt"/>
+                <a:ea typeface="+mn-ea"/>
+                <a:cs typeface="+mn-cs"/>
+              </a:defRPr>
+            </a:lvl7pPr>
+            <a:lvl8pPr marL="3200400" indent="0" algn="ctr" defTabSz="914400" rtl="0" eaLnBrk="1" latinLnBrk="0" hangingPunct="1">
+              <a:lnSpc>
+                <a:spcPct val="90000"/>
+              </a:lnSpc>
+              <a:spcBef>
+                <a:spcPts val="500"/>
+              </a:spcBef>
+              <a:buFont typeface="Arial" panose="020B0604020202020204" pitchFamily="34" charset="0"/>
+              <a:buNone/>
+              <a:defRPr sz="1600" kern="1200">
+                <a:solidFill>
+                  <a:schemeClr val="tx1"/>
+                </a:solidFill>
+                <a:latin typeface="+mn-lt"/>
+                <a:ea typeface="+mn-ea"/>
+                <a:cs typeface="+mn-cs"/>
+              </a:defRPr>
+            </a:lvl8pPr>
+            <a:lvl9pPr marL="3657600" indent="0" algn="ctr" defTabSz="914400" rtl="0" eaLnBrk="1" latinLnBrk="0" hangingPunct="1">
+              <a:lnSpc>
+                <a:spcPct val="90000"/>
+              </a:lnSpc>
+              <a:spcBef>
+                <a:spcPts val="500"/>
+              </a:spcBef>
+              <a:buFont typeface="Arial" panose="020B0604020202020204" pitchFamily="34" charset="0"/>
+              <a:buNone/>
+              <a:defRPr sz="1600" kern="1200">
+                <a:solidFill>
+                  <a:schemeClr val="tx1"/>
+                </a:solidFill>
+                <a:latin typeface="+mn-lt"/>
+                <a:ea typeface="+mn-ea"/>
+                <a:cs typeface="+mn-cs"/>
+              </a:defRPr>
+            </a:lvl9pPr>
+          </a:lstStyle>
+          <a:p>
+            <a:pPr algn="l"/>
+            <a:r>
+              <a:rPr lang="en-US" sz="7200" b="1" dirty="0" err="1">
+                <a:cs typeface="Calibri"/>
+              </a:rPr>
+              <a:t>Desafio</a:t>
+            </a:r>
+            <a:endParaRPr lang="en-US" sz="7200" b="1" dirty="0">
+              <a:cs typeface="Calibri"/>
+            </a:endParaRPr>
+          </a:p>
+        </p:txBody>
+      </p:sp>
+      <p:pic>
+        <p:nvPicPr>
+          <p:cNvPr id="1030" name="Picture 6" descr="JavaScript logo and symbol, meaning, history, PNG">
+            <a:extLst>
+              <a:ext uri="{FF2B5EF4-FFF2-40B4-BE49-F238E27FC236}">
+                <a16:creationId xmlns:a16="http://schemas.microsoft.com/office/drawing/2014/main" id="{7AB39698-0450-4DDC-81A6-73CCA4FEAC31}"/>
+              </a:ext>
+            </a:extLst>
+          </p:cNvPr>
+          <p:cNvPicPr>
+            <a:picLocks noChangeAspect="1" noChangeArrowheads="1"/>
+          </p:cNvPicPr>
+          <p:nvPr/>
+        </p:nvPicPr>
+        <p:blipFill>
+          <a:blip r:embed="rId2" cstate="print">
+            <a:extLst>
+              <a:ext uri="{28A0092B-C50C-407E-A947-70E740481C1C}">
+                <a14:useLocalDpi xmlns:a14="http://schemas.microsoft.com/office/drawing/2010/main" val="0"/>
+              </a:ext>
+            </a:extLst>
+          </a:blip>
+          <a:srcRect/>
+          <a:stretch>
+            <a:fillRect/>
+          </a:stretch>
+        </p:blipFill>
+        <p:spPr bwMode="auto">
+          <a:xfrm>
+            <a:off x="3204840" y="1693720"/>
+            <a:ext cx="5552896" cy="3470560"/>
+          </a:xfrm>
+          <a:prstGeom prst="rect">
+            <a:avLst/>
+          </a:prstGeom>
+          <a:noFill/>
+          <a:extLst>
+            <a:ext uri="{909E8E84-426E-40DD-AFC4-6F175D3DCCD1}">
+              <a14:hiddenFill xmlns:a14="http://schemas.microsoft.com/office/drawing/2010/main">
+                <a:solidFill>
+                  <a:srgbClr val="FFFFFF"/>
+                </a:solidFill>
+              </a14:hiddenFill>
+            </a:ext>
+          </a:extLst>
+        </p:spPr>
+      </p:pic>
+    </p:spTree>
+    <p:extLst>
+      <p:ext uri="{BB962C8B-B14F-4D97-AF65-F5344CB8AC3E}">
+        <p14:creationId xmlns:p14="http://schemas.microsoft.com/office/powerpoint/2010/main" val="2275557401"/>
+      </p:ext>
+    </p:extLst>
+  </p:cSld>
+  <p:clrMapOvr>
+    <a:masterClrMapping/>
+  </p:clrMapOvr>
+</p:sld>
+</file>
+
+<file path=ppt/slides/slide6.xml><?xml version="1.0" encoding="utf-8"?>
+<p:sld xmlns:a="http://schemas.openxmlformats.org/drawingml/2006/main" xmlns:r="http://schemas.openxmlformats.org/officeDocument/2006/relationships" xmlns:p="http://schemas.openxmlformats.org/presentationml/2006/main">
+  <p:cSld>
     <p:bg>
       <p:bgPr>
         <a:solidFill>

</xml_diff>